<commit_message>
docs: Updated Notebooks (no changes, executed again)
</commit_message>
<xml_diff>
--- a/docs/report.ipynb.pptx
+++ b/docs/report.ipynb.pptx
@@ -30,6 +30,10 @@
     <p:sldId id="278" r:id="rId29"/>
     <p:sldId id="279" r:id="rId30"/>
     <p:sldId id="280" r:id="rId31"/>
+    <p:sldId id="281" r:id="rId32"/>
+    <p:sldId id="282" r:id="rId33"/>
+    <p:sldId id="283" r:id="rId34"/>
+    <p:sldId id="284" r:id="rId35"/>
   </p:sldIdLst>
   <p:sldSz cx="9144000" cy="6858000" type="screen4x3"/>
   <p:notesSz cx="6858000" cy="9144000"/>
@@ -3193,7 +3197,7 @@
           <a:lstStyle/>
           <a:p>
             <a:r>
-              <a:t>Front Passenger Result</a:t>
+              <a:t>Driver Chest Deflection</a:t>
             </a:r>
           </a:p>
         </p:txBody>
@@ -3256,7 +3260,7 @@
           <a:lstStyle/>
           <a:p>
             <a:r>
-              <a:t>Front Passenger Rating</a:t>
+              <a:t>Driver Femur Axial Force</a:t>
             </a:r>
           </a:p>
         </p:txBody>
@@ -3319,7 +3323,7 @@
           <a:lstStyle/>
           <a:p>
             <a:r>
-              <a:t>Front Passenger Values</a:t>
+              <a:t>Front Passenger Result</a:t>
             </a:r>
           </a:p>
         </p:txBody>
@@ -3382,7 +3386,7 @@
           <a:lstStyle/>
           <a:p>
             <a:r>
-              <a:t>Front Passenger Head Acceleration</a:t>
+              <a:t>Front Passenger Rating</a:t>
             </a:r>
           </a:p>
         </p:txBody>
@@ -3445,7 +3449,7 @@
           <a:lstStyle/>
           <a:p>
             <a:r>
-              <a:t>Front Passenger Neck Load</a:t>
+              <a:t>Front Passenger Values</a:t>
             </a:r>
           </a:p>
         </p:txBody>
@@ -3508,7 +3512,7 @@
           <a:lstStyle/>
           <a:p>
             <a:r>
-              <a:t>Front Passenger Neck NIJ</a:t>
+              <a:t>Front Passenger Belt</a:t>
             </a:r>
           </a:p>
         </p:txBody>
@@ -3571,7 +3575,7 @@
           <a:lstStyle/>
           <a:p>
             <a:r>
-              <a:t>Front Passenger Chest Deflection</a:t>
+              <a:t>Front Passenger Head Acceleration</a:t>
             </a:r>
           </a:p>
         </p:txBody>
@@ -3634,7 +3638,7 @@
           <a:lstStyle/>
           <a:p>
             <a:r>
-              <a:t>Front Passenger Femur Axial Force</a:t>
+              <a:t>Front Passenger Neck Load</a:t>
             </a:r>
           </a:p>
         </p:txBody>
@@ -3697,7 +3701,7 @@
           <a:lstStyle/>
           <a:p>
             <a:r>
-              <a:t>Rear Passenger Result</a:t>
+              <a:t>Front Passenger Neck NIJ</a:t>
             </a:r>
           </a:p>
         </p:txBody>
@@ -3760,7 +3764,7 @@
           <a:lstStyle/>
           <a:p>
             <a:r>
-              <a:t>Rear Passenger Result</a:t>
+              <a:t>Front Passenger Chest Deflection</a:t>
             </a:r>
           </a:p>
         </p:txBody>
@@ -3823,7 +3827,7 @@
           <a:lstStyle/>
           <a:p>
             <a:r>
-              <a:t>Driver Result</a:t>
+              <a:t>Rating</a:t>
             </a:r>
           </a:p>
         </p:txBody>
@@ -3886,7 +3890,7 @@
           <a:lstStyle/>
           <a:p>
             <a:r>
-              <a:t>Rear Passenger Values</a:t>
+              <a:t>Front Passenger Femur Axial Force</a:t>
             </a:r>
           </a:p>
         </p:txBody>
@@ -3949,7 +3953,7 @@
           <a:lstStyle/>
           <a:p>
             <a:r>
-              <a:t>Rear Passenger Head Acceleration</a:t>
+              <a:t>Rear Passenger Result</a:t>
             </a:r>
           </a:p>
         </p:txBody>
@@ -4012,7 +4016,7 @@
           <a:lstStyle/>
           <a:p>
             <a:r>
-              <a:t>Rear Passenger Neck Load</a:t>
+              <a:t>Rear Passenger Result</a:t>
             </a:r>
           </a:p>
         </p:txBody>
@@ -4075,7 +4079,7 @@
           <a:lstStyle/>
           <a:p>
             <a:r>
-              <a:t>Rear Passenger Chest Deflection</a:t>
+              <a:t>Rear Passenger Values</a:t>
             </a:r>
           </a:p>
         </p:txBody>
@@ -4138,7 +4142,7 @@
           <a:lstStyle/>
           <a:p>
             <a:r>
-              <a:t>Rear Passenger Femur Axial Force</a:t>
+              <a:t>Rear Passenger Belt</a:t>
             </a:r>
           </a:p>
         </p:txBody>
@@ -4201,6 +4205,258 @@
           <a:lstStyle/>
           <a:p>
             <a:r>
+              <a:t>Rear Passenger Head Acceleration</a:t>
+            </a:r>
+          </a:p>
+        </p:txBody>
+      </p:sp>
+      <p:pic>
+        <p:nvPicPr>
+          <p:cNvPr id="3" name="Picture 2" descr="image.png"/>
+          <p:cNvPicPr>
+            <a:picLocks noChangeAspect="1"/>
+          </p:cNvPicPr>
+          <p:nvPr/>
+        </p:nvPicPr>
+        <p:blipFill>
+          <a:blip r:embed="rId2"/>
+          <a:stretch>
+            <a:fillRect/>
+          </a:stretch>
+        </p:blipFill>
+        <p:spPr>
+          <a:xfrm>
+            <a:off x="457200" y="1600200"/>
+            <a:ext cx="8181334" cy="4525963"/>
+          </a:xfrm>
+          <a:prstGeom prst="rect">
+            <a:avLst/>
+          </a:prstGeom>
+        </p:spPr>
+      </p:pic>
+    </p:spTree>
+  </p:cSld>
+  <p:clrMapOvr>
+    <a:masterClrMapping/>
+  </p:clrMapOvr>
+</p:sld>
+</file>
+
+<file path=ppt/slides/slide26.xml><?xml version="1.0" encoding="utf-8"?>
+<p:sld xmlns:a="http://schemas.openxmlformats.org/drawingml/2006/main" xmlns:p="http://schemas.openxmlformats.org/presentationml/2006/main" xmlns:r="http://schemas.openxmlformats.org/officeDocument/2006/relationships">
+  <p:cSld>
+    <p:spTree>
+      <p:nvGrpSpPr>
+        <p:cNvPr id="1" name=""/>
+        <p:cNvGrpSpPr/>
+        <p:nvPr/>
+      </p:nvGrpSpPr>
+      <p:grpSpPr/>
+      <p:sp>
+        <p:nvSpPr>
+          <p:cNvPr id="2" name="Title 1"/>
+          <p:cNvSpPr>
+            <a:spLocks noGrp="1"/>
+          </p:cNvSpPr>
+          <p:nvPr>
+            <p:ph type="title"/>
+          </p:nvPr>
+        </p:nvSpPr>
+        <p:spPr/>
+        <p:txBody>
+          <a:bodyPr/>
+          <a:lstStyle/>
+          <a:p>
+            <a:r>
+              <a:t>Rear Passenger Neck Load</a:t>
+            </a:r>
+          </a:p>
+        </p:txBody>
+      </p:sp>
+      <p:pic>
+        <p:nvPicPr>
+          <p:cNvPr id="3" name="Picture 2" descr="image.png"/>
+          <p:cNvPicPr>
+            <a:picLocks noChangeAspect="1"/>
+          </p:cNvPicPr>
+          <p:nvPr/>
+        </p:nvPicPr>
+        <p:blipFill>
+          <a:blip r:embed="rId2"/>
+          <a:stretch>
+            <a:fillRect/>
+          </a:stretch>
+        </p:blipFill>
+        <p:spPr>
+          <a:xfrm>
+            <a:off x="457200" y="1600200"/>
+            <a:ext cx="8181334" cy="4525963"/>
+          </a:xfrm>
+          <a:prstGeom prst="rect">
+            <a:avLst/>
+          </a:prstGeom>
+        </p:spPr>
+      </p:pic>
+    </p:spTree>
+  </p:cSld>
+  <p:clrMapOvr>
+    <a:masterClrMapping/>
+  </p:clrMapOvr>
+</p:sld>
+</file>
+
+<file path=ppt/slides/slide27.xml><?xml version="1.0" encoding="utf-8"?>
+<p:sld xmlns:a="http://schemas.openxmlformats.org/drawingml/2006/main" xmlns:p="http://schemas.openxmlformats.org/presentationml/2006/main" xmlns:r="http://schemas.openxmlformats.org/officeDocument/2006/relationships">
+  <p:cSld>
+    <p:spTree>
+      <p:nvGrpSpPr>
+        <p:cNvPr id="1" name=""/>
+        <p:cNvGrpSpPr/>
+        <p:nvPr/>
+      </p:nvGrpSpPr>
+      <p:grpSpPr/>
+      <p:sp>
+        <p:nvSpPr>
+          <p:cNvPr id="2" name="Title 1"/>
+          <p:cNvSpPr>
+            <a:spLocks noGrp="1"/>
+          </p:cNvSpPr>
+          <p:nvPr>
+            <p:ph type="title"/>
+          </p:nvPr>
+        </p:nvSpPr>
+        <p:spPr/>
+        <p:txBody>
+          <a:bodyPr/>
+          <a:lstStyle/>
+          <a:p>
+            <a:r>
+              <a:t>Rear Passenger Chest Deflection</a:t>
+            </a:r>
+          </a:p>
+        </p:txBody>
+      </p:sp>
+      <p:pic>
+        <p:nvPicPr>
+          <p:cNvPr id="3" name="Picture 2" descr="image.png"/>
+          <p:cNvPicPr>
+            <a:picLocks noChangeAspect="1"/>
+          </p:cNvPicPr>
+          <p:nvPr/>
+        </p:nvPicPr>
+        <p:blipFill>
+          <a:blip r:embed="rId2"/>
+          <a:stretch>
+            <a:fillRect/>
+          </a:stretch>
+        </p:blipFill>
+        <p:spPr>
+          <a:xfrm>
+            <a:off x="457200" y="1600200"/>
+            <a:ext cx="8181334" cy="4525963"/>
+          </a:xfrm>
+          <a:prstGeom prst="rect">
+            <a:avLst/>
+          </a:prstGeom>
+        </p:spPr>
+      </p:pic>
+    </p:spTree>
+  </p:cSld>
+  <p:clrMapOvr>
+    <a:masterClrMapping/>
+  </p:clrMapOvr>
+</p:sld>
+</file>
+
+<file path=ppt/slides/slide28.xml><?xml version="1.0" encoding="utf-8"?>
+<p:sld xmlns:a="http://schemas.openxmlformats.org/drawingml/2006/main" xmlns:p="http://schemas.openxmlformats.org/presentationml/2006/main" xmlns:r="http://schemas.openxmlformats.org/officeDocument/2006/relationships">
+  <p:cSld>
+    <p:spTree>
+      <p:nvGrpSpPr>
+        <p:cNvPr id="1" name=""/>
+        <p:cNvGrpSpPr/>
+        <p:nvPr/>
+      </p:nvGrpSpPr>
+      <p:grpSpPr/>
+      <p:sp>
+        <p:nvSpPr>
+          <p:cNvPr id="2" name="Title 1"/>
+          <p:cNvSpPr>
+            <a:spLocks noGrp="1"/>
+          </p:cNvSpPr>
+          <p:nvPr>
+            <p:ph type="title"/>
+          </p:nvPr>
+        </p:nvSpPr>
+        <p:spPr/>
+        <p:txBody>
+          <a:bodyPr/>
+          <a:lstStyle/>
+          <a:p>
+            <a:r>
+              <a:t>Rear Passenger Femur Axial Force</a:t>
+            </a:r>
+          </a:p>
+        </p:txBody>
+      </p:sp>
+      <p:pic>
+        <p:nvPicPr>
+          <p:cNvPr id="3" name="Picture 2" descr="image.png"/>
+          <p:cNvPicPr>
+            <a:picLocks noChangeAspect="1"/>
+          </p:cNvPicPr>
+          <p:nvPr/>
+        </p:nvPicPr>
+        <p:blipFill>
+          <a:blip r:embed="rId2"/>
+          <a:stretch>
+            <a:fillRect/>
+          </a:stretch>
+        </p:blipFill>
+        <p:spPr>
+          <a:xfrm>
+            <a:off x="457200" y="1600200"/>
+            <a:ext cx="8181334" cy="4525963"/>
+          </a:xfrm>
+          <a:prstGeom prst="rect">
+            <a:avLst/>
+          </a:prstGeom>
+        </p:spPr>
+      </p:pic>
+    </p:spTree>
+  </p:cSld>
+  <p:clrMapOvr>
+    <a:masterClrMapping/>
+  </p:clrMapOvr>
+</p:sld>
+</file>
+
+<file path=ppt/slides/slide29.xml><?xml version="1.0" encoding="utf-8"?>
+<p:sld xmlns:a="http://schemas.openxmlformats.org/drawingml/2006/main" xmlns:p="http://schemas.openxmlformats.org/presentationml/2006/main" xmlns:r="http://schemas.openxmlformats.org/officeDocument/2006/relationships">
+  <p:cSld>
+    <p:spTree>
+      <p:nvGrpSpPr>
+        <p:cNvPr id="1" name=""/>
+        <p:cNvGrpSpPr/>
+        <p:nvPr/>
+      </p:nvGrpSpPr>
+      <p:grpSpPr/>
+      <p:sp>
+        <p:nvSpPr>
+          <p:cNvPr id="2" name="Title 1"/>
+          <p:cNvSpPr>
+            <a:spLocks noGrp="1"/>
+          </p:cNvSpPr>
+          <p:nvPr>
+            <p:ph type="title"/>
+          </p:nvPr>
+        </p:nvSpPr>
+        <p:spPr/>
+        <p:txBody>
+          <a:bodyPr/>
+          <a:lstStyle/>
+          <a:p>
+            <a:r>
               <a:t>Occupant Load Criterion (OLC)</a:t>
             </a:r>
           </a:p>
@@ -4264,7 +4520,7 @@
           <a:lstStyle/>
           <a:p>
             <a:r>
-              <a:t>Driver Rating</a:t>
+              <a:t>Driver Result</a:t>
             </a:r>
           </a:p>
         </p:txBody>
@@ -4327,7 +4583,7 @@
           <a:lstStyle/>
           <a:p>
             <a:r>
-              <a:t>Driver Values</a:t>
+              <a:t>Driver Rating</a:t>
             </a:r>
           </a:p>
         </p:txBody>
@@ -4390,7 +4646,7 @@
           <a:lstStyle/>
           <a:p>
             <a:r>
-              <a:t>Driver Head Acceleration</a:t>
+              <a:t>Driver Values</a:t>
             </a:r>
           </a:p>
         </p:txBody>
@@ -4453,7 +4709,7 @@
           <a:lstStyle/>
           <a:p>
             <a:r>
-              <a:t>Driver Neck Load</a:t>
+              <a:t>Driver Belt</a:t>
             </a:r>
           </a:p>
         </p:txBody>
@@ -4516,7 +4772,7 @@
           <a:lstStyle/>
           <a:p>
             <a:r>
-              <a:t>Driver Neck NIJ</a:t>
+              <a:t>Driver Head Acceleration</a:t>
             </a:r>
           </a:p>
         </p:txBody>
@@ -4579,7 +4835,7 @@
           <a:lstStyle/>
           <a:p>
             <a:r>
-              <a:t>Driver Chest Deflection</a:t>
+              <a:t>Driver Neck Load</a:t>
             </a:r>
           </a:p>
         </p:txBody>
@@ -4642,7 +4898,7 @@
           <a:lstStyle/>
           <a:p>
             <a:r>
-              <a:t>Driver Femur Axial Force</a:t>
+              <a:t>Driver Neck NIJ</a:t>
             </a:r>
           </a:p>
         </p:txBody>

</xml_diff>